<commit_message>
added slides for two additional optimizations
</commit_message>
<xml_diff>
--- a/PowerPoints/12 - Optimization.pptx
+++ b/PowerPoints/12 - Optimization.pptx
@@ -1,14 +1,14 @@
 
 <file path=ppt/presentation.xml><?xml version="1.0" encoding="utf-8"?>
-<p:presentation xmlns:a="http://schemas.openxmlformats.org/drawingml/2006/main" xmlns:r="http://schemas.openxmlformats.org/officeDocument/2006/relationships" xmlns:p="http://schemas.openxmlformats.org/presentationml/2006/main" saveSubsetFonts="1">
+<p:presentation xmlns:a="http://schemas.openxmlformats.org/drawingml/2006/main" xmlns:r="http://schemas.openxmlformats.org/officeDocument/2006/relationships" xmlns:p="http://schemas.openxmlformats.org/presentationml/2006/main" saveSubsetFonts="1" autoCompressPictures="0">
   <p:sldMasterIdLst>
     <p:sldMasterId id="2147483651" r:id="rId1"/>
   </p:sldMasterIdLst>
   <p:notesMasterIdLst>
-    <p:notesMasterId r:id="rId21"/>
+    <p:notesMasterId r:id="rId24"/>
   </p:notesMasterIdLst>
   <p:handoutMasterIdLst>
-    <p:handoutMasterId r:id="rId22"/>
+    <p:handoutMasterId r:id="rId25"/>
   </p:handoutMasterIdLst>
   <p:sldIdLst>
     <p:sldId id="256" r:id="rId2"/>
@@ -27,9 +27,12 @@
     <p:sldId id="267" r:id="rId15"/>
     <p:sldId id="274" r:id="rId16"/>
     <p:sldId id="275" r:id="rId17"/>
-    <p:sldId id="268" r:id="rId18"/>
-    <p:sldId id="269" r:id="rId19"/>
-    <p:sldId id="272" r:id="rId20"/>
+    <p:sldId id="276" r:id="rId18"/>
+    <p:sldId id="278" r:id="rId19"/>
+    <p:sldId id="277" r:id="rId20"/>
+    <p:sldId id="268" r:id="rId21"/>
+    <p:sldId id="269" r:id="rId22"/>
+    <p:sldId id="272" r:id="rId23"/>
   </p:sldIdLst>
   <p:sldSz cx="9144000" cy="6858000" type="screen4x3"/>
   <p:notesSz cx="7315200" cy="9601200"/>
@@ -4826,8 +4829,13 @@
           <a:p>
             <a:r>
               <a:rPr lang="en-US" dirty="0"/>
-              <a:t> Example (from Wikipedia)</a:t>
-            </a:r>
+              <a:t> Example </a:t>
+            </a:r>
+            <a:r>
+              <a:rPr lang="en-US" sz="2000" dirty="0"/>
+              <a:t>(from Wikipedia)</a:t>
+            </a:r>
+            <a:endParaRPr lang="en-US" dirty="0"/>
           </a:p>
           <a:p>
             <a:pPr lvl="1">
@@ -5208,7 +5216,7 @@
           <a:p>
             <a:pPr marL="457200" lvl="1" indent="0">
               <a:spcBef>
-                <a:spcPts val="200"/>
+                <a:spcPts val="0"/>
               </a:spcBef>
               <a:buNone/>
             </a:pPr>
@@ -5222,7 +5230,7 @@
           <a:p>
             <a:pPr marL="457200" lvl="1" indent="0">
               <a:spcBef>
-                <a:spcPts val="200"/>
+                <a:spcPts val="0"/>
               </a:spcBef>
               <a:buNone/>
             </a:pPr>
@@ -5233,7 +5241,7 @@
           <a:p>
             <a:pPr marL="457200" lvl="1" indent="0">
               <a:spcBef>
-                <a:spcPts val="200"/>
+                <a:spcPts val="0"/>
               </a:spcBef>
               <a:buNone/>
             </a:pPr>
@@ -5247,7 +5255,7 @@
           <a:p>
             <a:pPr marL="457200" lvl="1" indent="0">
               <a:spcBef>
-                <a:spcPts val="200"/>
+                <a:spcPts val="0"/>
               </a:spcBef>
               <a:buNone/>
             </a:pPr>
@@ -5261,7 +5269,7 @@
           <a:p>
             <a:pPr marL="457200" lvl="1" indent="0">
               <a:spcBef>
-                <a:spcPts val="200"/>
+                <a:spcPts val="0"/>
               </a:spcBef>
               <a:buNone/>
             </a:pPr>
@@ -5275,7 +5283,7 @@
           <a:p>
             <a:pPr marL="457200" lvl="1" indent="0">
               <a:spcBef>
-                <a:spcPts val="200"/>
+                <a:spcPts val="0"/>
               </a:spcBef>
               <a:buNone/>
             </a:pPr>
@@ -5284,15 +5292,6 @@
                 <a:latin typeface="Consolas" panose="020B0609020204030204" pitchFamily="49" charset="0"/>
               </a:rPr>
               <a:t>  }</a:t>
-            </a:r>
-          </a:p>
-          <a:p>
-            <a:pPr marL="0" indent="0">
-              <a:buNone/>
-            </a:pPr>
-            <a:r>
-              <a:rPr lang="en-US" dirty="0"/>
-              <a:t> </a:t>
             </a:r>
           </a:p>
         </p:txBody>
@@ -5610,7 +5609,13 @@
       </p:grpSpPr>
       <p:sp>
         <p:nvSpPr>
-          <p:cNvPr id="2" name="Title 1"/>
+          <p:cNvPr id="2" name="Title 1">
+            <a:extLst>
+              <a:ext uri="{FF2B5EF4-FFF2-40B4-BE49-F238E27FC236}">
+                <a16:creationId xmlns:a16="http://schemas.microsoft.com/office/drawing/2014/main" id="{932DD7A6-E6F7-C968-E0D5-590D79ECA3A3}"/>
+              </a:ext>
+            </a:extLst>
+          </p:cNvPr>
           <p:cNvSpPr>
             <a:spLocks noGrp="1"/>
           </p:cNvSpPr>
@@ -5625,14 +5630,27 @@
           <a:p>
             <a:r>
               <a:rPr lang="en-US" dirty="0"/>
-              <a:t>Peephole Optimization</a:t>
-            </a:r>
-          </a:p>
-        </p:txBody>
-      </p:sp>
-      <p:sp>
-        <p:nvSpPr>
-          <p:cNvPr id="3" name="Content Placeholder 2"/>
+              <a:t>Subprogram Inlining</a:t>
+            </a:r>
+            <a:br>
+              <a:rPr lang="en-US" dirty="0"/>
+            </a:br>
+            <a:r>
+              <a:rPr lang="en-US" sz="2400" dirty="0"/>
+              <a:t>(a.k.a. Function Inlining)</a:t>
+            </a:r>
+          </a:p>
+        </p:txBody>
+      </p:sp>
+      <p:sp>
+        <p:nvSpPr>
+          <p:cNvPr id="3" name="Content Placeholder 2">
+            <a:extLst>
+              <a:ext uri="{FF2B5EF4-FFF2-40B4-BE49-F238E27FC236}">
+                <a16:creationId xmlns:a16="http://schemas.microsoft.com/office/drawing/2014/main" id="{C9D9DB40-E06B-90B1-349A-458277AC6B4E}"/>
+              </a:ext>
+            </a:extLst>
+          </p:cNvPr>
           <p:cNvSpPr>
             <a:spLocks noGrp="1"/>
           </p:cNvSpPr>
@@ -5647,69 +5665,66 @@
           <a:p>
             <a:r>
               <a:rPr lang="en-US" dirty="0"/>
-              <a:t>Applied to the generated target machine code or a</a:t>
-            </a:r>
-            <a:br>
-              <a:rPr lang="en-US" dirty="0"/>
-            </a:br>
-            <a:r>
-              <a:rPr lang="en-US" dirty="0"/>
-              <a:t>low-level intermediate representation.</a:t>
-            </a:r>
-          </a:p>
-          <a:p>
-            <a:r>
-              <a:rPr lang="en-US" dirty="0"/>
-              <a:t>Basic idea: Analyze a small sequence of instructions at a time (the peephole) for possible performance improvements.</a:t>
-            </a:r>
-          </a:p>
-          <a:p>
-            <a:r>
-              <a:rPr lang="en-US" dirty="0"/>
-              <a:t>The peephole is a small window into the generated code.</a:t>
-            </a:r>
-          </a:p>
-          <a:p>
-            <a:r>
-              <a:rPr lang="en-US" dirty="0"/>
-              <a:t>Examples of peephole optimizations</a:t>
+              <a:t>Eliminate the call/return/parameter passing overhead of subprograms by expanding the body of the called subprogram inline.</a:t>
             </a:r>
           </a:p>
           <a:p>
             <a:pPr lvl="1"/>
             <a:r>
               <a:rPr lang="en-US" dirty="0"/>
-              <a:t>elimination of redundant loads and stores</a:t>
+              <a:t>similar to macro expansion available in C and many assemblers except that the optimization is performed by the compiler</a:t>
             </a:r>
           </a:p>
           <a:p>
             <a:pPr lvl="1"/>
             <a:r>
               <a:rPr lang="en-US" dirty="0"/>
-              <a:t>elimination of branch instructions to other branch instructions</a:t>
+              <a:t>can improve runtime performance, but there is a risk increased object code size in certain cases</a:t>
             </a:r>
           </a:p>
           <a:p>
             <a:pPr lvl="1"/>
             <a:r>
               <a:rPr lang="en-US" dirty="0"/>
-              <a:t>algebraic identities and strength reduction</a:t>
-            </a:r>
-          </a:p>
-          <a:p>
-            <a:pPr lvl="2">
-              <a:buNone/>
-            </a:pPr>
-            <a:r>
-              <a:rPr lang="en-US" dirty="0"/>
-              <a:t>(can be easier to detect in the target machine code)</a:t>
-            </a:r>
-          </a:p>
-        </p:txBody>
-      </p:sp>
-      <p:sp>
-        <p:nvSpPr>
-          <p:cNvPr id="4" name="Footer Placeholder 3"/>
+              <a:t>added advantage: subprogram inlining often reveals opportunities for additional optimizations</a:t>
+            </a:r>
+          </a:p>
+          <a:p>
+            <a:pPr lvl="1"/>
+            <a:r>
+              <a:rPr lang="en-US" dirty="0"/>
+              <a:t>works best for small subprograms or for larger subprograms that are called infrequently</a:t>
+            </a:r>
+          </a:p>
+          <a:p>
+            <a:r>
+              <a:rPr lang="en-US" dirty="0"/>
+              <a:t>Recursive subprograms are not usually </a:t>
+            </a:r>
+            <a:r>
+              <a:rPr lang="en-US" dirty="0" err="1"/>
+              <a:t>inlined</a:t>
+            </a:r>
+            <a:r>
+              <a:rPr lang="en-US" dirty="0"/>
+              <a:t> unless the recursive call can be eliminated; e.g., tail recursion.</a:t>
+            </a:r>
+          </a:p>
+          <a:p>
+            <a:pPr lvl="1"/>
+            <a:endParaRPr lang="en-US" dirty="0"/>
+          </a:p>
+        </p:txBody>
+      </p:sp>
+      <p:sp>
+        <p:nvSpPr>
+          <p:cNvPr id="4" name="Footer Placeholder 3">
+            <a:extLst>
+              <a:ext uri="{FF2B5EF4-FFF2-40B4-BE49-F238E27FC236}">
+                <a16:creationId xmlns:a16="http://schemas.microsoft.com/office/drawing/2014/main" id="{CA44232A-2827-8FFD-9B59-74E02D459DEF}"/>
+              </a:ext>
+            </a:extLst>
+          </p:cNvPr>
           <p:cNvSpPr>
             <a:spLocks noGrp="1"/>
           </p:cNvSpPr>
@@ -5734,7 +5749,13 @@
       </p:sp>
       <p:sp>
         <p:nvSpPr>
-          <p:cNvPr id="5" name="Slide Number Placeholder 4"/>
+          <p:cNvPr id="5" name="Slide Number Placeholder 4">
+            <a:extLst>
+              <a:ext uri="{FF2B5EF4-FFF2-40B4-BE49-F238E27FC236}">
+                <a16:creationId xmlns:a16="http://schemas.microsoft.com/office/drawing/2014/main" id="{25D3FF97-F9A3-3BAF-3186-9DA7B2B8493D}"/>
+              </a:ext>
+            </a:extLst>
+          </p:cNvPr>
           <p:cNvSpPr>
             <a:spLocks noGrp="1"/>
           </p:cNvSpPr>
@@ -5766,6 +5787,11 @@
         </p:txBody>
       </p:sp>
     </p:spTree>
+    <p:extLst>
+      <p:ext uri="{BB962C8B-B14F-4D97-AF65-F5344CB8AC3E}">
+        <p14:creationId xmlns:p14="http://schemas.microsoft.com/office/powerpoint/2010/main" val="2793821836"/>
+      </p:ext>
+    </p:extLst>
   </p:cSld>
   <p:clrMapOvr>
     <a:masterClrMapping/>
@@ -5792,7 +5818,13 @@
       </p:grpSpPr>
       <p:sp>
         <p:nvSpPr>
-          <p:cNvPr id="2" name="Title 1"/>
+          <p:cNvPr id="2" name="Title 1">
+            <a:extLst>
+              <a:ext uri="{FF2B5EF4-FFF2-40B4-BE49-F238E27FC236}">
+                <a16:creationId xmlns:a16="http://schemas.microsoft.com/office/drawing/2014/main" id="{932DD7A6-E6F7-C968-E0D5-590D79ECA3A3}"/>
+              </a:ext>
+            </a:extLst>
+          </p:cNvPr>
           <p:cNvSpPr>
             <a:spLocks noGrp="1"/>
           </p:cNvSpPr>
@@ -5807,390 +5839,169 @@
           <a:p>
             <a:r>
               <a:rPr lang="en-US" dirty="0"/>
-              <a:t>Example: Peephole Optimization</a:t>
-            </a:r>
-            <a:endParaRPr lang="en-US" sz="2800" dirty="0"/>
-          </a:p>
-        </p:txBody>
-      </p:sp>
-      <p:sp>
-        <p:nvSpPr>
-          <p:cNvPr id="3" name="Content Placeholder 2"/>
+              <a:t>Example: Subprogram Inlining</a:t>
+            </a:r>
+            <a:endParaRPr lang="en-US" sz="2400" dirty="0"/>
+          </a:p>
+        </p:txBody>
+      </p:sp>
+      <p:sp>
+        <p:nvSpPr>
+          <p:cNvPr id="3" name="Content Placeholder 2">
+            <a:extLst>
+              <a:ext uri="{FF2B5EF4-FFF2-40B4-BE49-F238E27FC236}">
+                <a16:creationId xmlns:a16="http://schemas.microsoft.com/office/drawing/2014/main" id="{C9D9DB40-E06B-90B1-349A-458277AC6B4E}"/>
+              </a:ext>
+            </a:extLst>
+          </p:cNvPr>
           <p:cNvSpPr>
             <a:spLocks noGrp="1"/>
           </p:cNvSpPr>
           <p:nvPr>
-            <p:ph sz="half" idx="1"/>
-          </p:nvPr>
-        </p:nvSpPr>
-        <p:spPr/>
-        <p:txBody>
-          <a:bodyPr/>
-          <a:lstStyle/>
-          <a:p>
-            <a:pPr marL="274320" indent="0">
+            <p:ph idx="1"/>
+          </p:nvPr>
+        </p:nvSpPr>
+        <p:spPr/>
+        <p:txBody>
+          <a:bodyPr/>
+          <a:lstStyle/>
+          <a:p>
+            <a:pPr marL="182880" indent="0">
               <a:spcBef>
-                <a:spcPts val="0"/>
+                <a:spcPts val="300"/>
               </a:spcBef>
               <a:buNone/>
             </a:pPr>
             <a:r>
-              <a:rPr lang="en-US" sz="2000" b="1" dirty="0">
-                <a:cs typeface="Consolas" pitchFamily="49" charset="0"/>
-              </a:rPr>
-              <a:t>Source Code</a:t>
-            </a:r>
-          </a:p>
-          <a:p>
-            <a:pPr marL="274320" indent="0">
+              <a:rPr lang="en-US" sz="1800" dirty="0">
+                <a:latin typeface="Consolas" panose="020B0609020204030204" pitchFamily="49" charset="0"/>
+              </a:rPr>
+              <a:t>proc </a:t>
+            </a:r>
+            <a:r>
+              <a:rPr lang="en-US" sz="1800" dirty="0" err="1">
+                <a:latin typeface="Consolas" panose="020B0609020204030204" pitchFamily="49" charset="0"/>
+              </a:rPr>
+              <a:t>inc</a:t>
+            </a:r>
+            <a:r>
+              <a:rPr lang="en-US" sz="1800" dirty="0">
+                <a:latin typeface="Consolas" panose="020B0609020204030204" pitchFamily="49" charset="0"/>
+              </a:rPr>
+              <a:t>(var x : Integer)</a:t>
+            </a:r>
+          </a:p>
+          <a:p>
+            <a:pPr marL="182880" indent="0">
               <a:spcBef>
-                <a:spcPts val="0"/>
+                <a:spcPts val="300"/>
               </a:spcBef>
               <a:buNone/>
             </a:pPr>
             <a:r>
               <a:rPr lang="en-US" sz="1800" dirty="0">
-                <a:latin typeface="Consolas" pitchFamily="49" charset="0"/>
-                <a:cs typeface="Consolas" pitchFamily="49" charset="0"/>
-              </a:rPr>
-              <a:t>...</a:t>
-            </a:r>
-          </a:p>
-          <a:p>
-            <a:pPr marL="274320" indent="0">
+                <a:latin typeface="Consolas" panose="020B0609020204030204" pitchFamily="49" charset="0"/>
+              </a:rPr>
+              <a:t>  {</a:t>
+            </a:r>
+          </a:p>
+          <a:p>
+            <a:pPr marL="182880" indent="0">
               <a:spcBef>
-                <a:spcPts val="0"/>
+                <a:spcPts val="300"/>
               </a:spcBef>
               <a:buNone/>
             </a:pPr>
             <a:r>
               <a:rPr lang="en-US" sz="1800" dirty="0">
-                <a:latin typeface="Consolas" pitchFamily="49" charset="0"/>
-                <a:cs typeface="Consolas" pitchFamily="49" charset="0"/>
-              </a:rPr>
-              <a:t>loop</a:t>
-            </a:r>
-          </a:p>
-          <a:p>
-            <a:pPr marL="274320" indent="0">
+                <a:latin typeface="Consolas" panose="020B0609020204030204" pitchFamily="49" charset="0"/>
+              </a:rPr>
+              <a:t>    x := x + 1;</a:t>
+            </a:r>
+          </a:p>
+          <a:p>
+            <a:pPr marL="182880" indent="0">
               <a:spcBef>
-                <a:spcPts val="0"/>
+                <a:spcPts val="300"/>
               </a:spcBef>
               <a:buNone/>
             </a:pPr>
             <a:r>
               <a:rPr lang="en-US" sz="1800" dirty="0">
-                <a:latin typeface="Consolas" pitchFamily="49" charset="0"/>
-                <a:cs typeface="Consolas" pitchFamily="49" charset="0"/>
-              </a:rPr>
-              <a:t>  {</a:t>
-            </a:r>
-          </a:p>
-          <a:p>
-            <a:pPr marL="274320" indent="0">
-              <a:spcBef>
-                <a:spcPts val="0"/>
-              </a:spcBef>
+                <a:latin typeface="Consolas" panose="020B0609020204030204" pitchFamily="49" charset="0"/>
+              </a:rPr>
+              <a:t>  }</a:t>
+            </a:r>
+          </a:p>
+          <a:p>
+            <a:r>
+              <a:rPr lang="en-US" dirty="0"/>
+              <a:t>For an integer variable n, replacing a call</a:t>
+            </a:r>
+          </a:p>
+          <a:p>
+            <a:pPr marL="457200" lvl="1" indent="0">
               <a:buNone/>
             </a:pPr>
             <a:r>
-              <a:rPr lang="en-US" sz="1800" dirty="0">
-                <a:latin typeface="Consolas" pitchFamily="49" charset="0"/>
-                <a:cs typeface="Consolas" pitchFamily="49" charset="0"/>
-              </a:rPr>
-              <a:t>    ...</a:t>
-            </a:r>
-          </a:p>
-          <a:p>
-            <a:pPr marL="274320" indent="0">
-              <a:spcBef>
-                <a:spcPts val="0"/>
-              </a:spcBef>
+              <a:rPr lang="en-US" dirty="0">
+                <a:latin typeface="Consolas" panose="020B0609020204030204" pitchFamily="49" charset="0"/>
+              </a:rPr>
+              <a:t>  </a:t>
+            </a:r>
+            <a:r>
+              <a:rPr lang="en-US" dirty="0" err="1">
+                <a:latin typeface="Consolas" panose="020B0609020204030204" pitchFamily="49" charset="0"/>
+              </a:rPr>
+              <a:t>inc</a:t>
+            </a:r>
+            <a:r>
+              <a:rPr lang="en-US" dirty="0">
+                <a:latin typeface="Consolas" panose="020B0609020204030204" pitchFamily="49" charset="0"/>
+              </a:rPr>
+              <a:t>(n)</a:t>
+            </a:r>
+          </a:p>
+          <a:p>
+            <a:pPr marL="457200" lvl="1" indent="0">
               <a:buNone/>
             </a:pPr>
             <a:r>
-              <a:rPr lang="en-US" sz="1800" dirty="0">
-                <a:latin typeface="Consolas" pitchFamily="49" charset="0"/>
-                <a:cs typeface="Consolas" pitchFamily="49" charset="0"/>
-              </a:rPr>
-              <a:t>    exit when x &gt; 0;</a:t>
-            </a:r>
-          </a:p>
-          <a:p>
-            <a:pPr marL="274320" indent="0">
-              <a:spcBef>
-                <a:spcPts val="0"/>
-              </a:spcBef>
+              <a:rPr lang="en-US" dirty="0"/>
+              <a:t>by</a:t>
+            </a:r>
+          </a:p>
+          <a:p>
+            <a:pPr marL="457200" lvl="1" indent="0">
               <a:buNone/>
             </a:pPr>
             <a:r>
-              <a:rPr lang="en-US" sz="1800" dirty="0">
-                <a:latin typeface="Consolas" pitchFamily="49" charset="0"/>
-                <a:cs typeface="Consolas" pitchFamily="49" charset="0"/>
-              </a:rPr>
-              <a:t>  }</a:t>
-            </a:r>
-          </a:p>
-          <a:p>
-            <a:pPr marL="274320" indent="0">
-              <a:spcBef>
-                <a:spcPts val="0"/>
-              </a:spcBef>
+              <a:rPr lang="en-US" dirty="0">
+                <a:latin typeface="Consolas" panose="020B0609020204030204" pitchFamily="49" charset="0"/>
+              </a:rPr>
+              <a:t>  n := n + 1</a:t>
+            </a:r>
+          </a:p>
+          <a:p>
+            <a:pPr marL="457200" lvl="1" indent="0">
               <a:buNone/>
             </a:pPr>
             <a:r>
-              <a:rPr lang="en-US" sz="1800" dirty="0">
-                <a:latin typeface="Consolas" pitchFamily="49" charset="0"/>
-                <a:cs typeface="Consolas" pitchFamily="49" charset="0"/>
-              </a:rPr>
-              <a:t>...</a:t>
-            </a:r>
-          </a:p>
-        </p:txBody>
-      </p:sp>
-      <p:sp>
-        <p:nvSpPr>
-          <p:cNvPr id="9" name="Content Placeholder 8"/>
-          <p:cNvSpPr>
-            <a:spLocks noGrp="1"/>
-          </p:cNvSpPr>
-          <p:nvPr>
-            <p:ph sz="half" idx="2"/>
-          </p:nvPr>
-        </p:nvSpPr>
-        <p:spPr/>
-        <p:txBody>
-          <a:bodyPr/>
-          <a:lstStyle/>
-          <a:p>
-            <a:pPr marL="274320" indent="0">
-              <a:spcBef>
-                <a:spcPts val="0"/>
-              </a:spcBef>
-              <a:buNone/>
-            </a:pPr>
-            <a:r>
-              <a:rPr lang="en-US" sz="2000" b="1" dirty="0">
-                <a:cs typeface="Consolas" pitchFamily="49" charset="0"/>
-              </a:rPr>
-              <a:t>Target Code</a:t>
-            </a:r>
-          </a:p>
-          <a:p>
-            <a:pPr marL="274320" indent="0">
-              <a:spcBef>
-                <a:spcPts val="0"/>
-              </a:spcBef>
-              <a:buNone/>
-            </a:pPr>
-            <a:r>
-              <a:rPr lang="en-US" sz="1800" dirty="0">
-                <a:latin typeface="Consolas" pitchFamily="49" charset="0"/>
-                <a:cs typeface="Consolas" pitchFamily="49" charset="0"/>
-              </a:rPr>
-              <a:t>L4:   </a:t>
-            </a:r>
-          </a:p>
-          <a:p>
-            <a:pPr marL="274320" indent="0">
-              <a:spcBef>
-                <a:spcPts val="0"/>
-              </a:spcBef>
-              <a:buNone/>
-            </a:pPr>
-            <a:r>
-              <a:rPr lang="en-US" sz="1800" dirty="0">
-                <a:latin typeface="Consolas" pitchFamily="49" charset="0"/>
-                <a:cs typeface="Consolas" pitchFamily="49" charset="0"/>
-              </a:rPr>
-              <a:t>   ...</a:t>
-            </a:r>
-          </a:p>
-          <a:p>
-            <a:pPr marL="274320" indent="0">
-              <a:spcBef>
-                <a:spcPts val="0"/>
-              </a:spcBef>
-              <a:buNone/>
-            </a:pPr>
-            <a:r>
-              <a:rPr lang="en-US" sz="1800" dirty="0">
-                <a:latin typeface="Consolas" pitchFamily="49" charset="0"/>
-                <a:cs typeface="Consolas" pitchFamily="49" charset="0"/>
-              </a:rPr>
-              <a:t>   LDLADDR 0</a:t>
-            </a:r>
-          </a:p>
-          <a:p>
-            <a:pPr marL="274320" indent="0">
-              <a:spcBef>
-                <a:spcPts val="0"/>
-              </a:spcBef>
-              <a:buNone/>
-            </a:pPr>
-            <a:r>
-              <a:rPr lang="en-US" sz="1800" dirty="0">
-                <a:latin typeface="Consolas" pitchFamily="49" charset="0"/>
-                <a:cs typeface="Consolas" pitchFamily="49" charset="0"/>
-              </a:rPr>
-              <a:t>   LOADW</a:t>
-            </a:r>
-          </a:p>
-          <a:p>
-            <a:pPr marL="274320" indent="0">
-              <a:spcBef>
-                <a:spcPts val="0"/>
-              </a:spcBef>
-              <a:buNone/>
-            </a:pPr>
-            <a:r>
-              <a:rPr lang="en-US" sz="1800" dirty="0">
-                <a:latin typeface="Consolas" pitchFamily="49" charset="0"/>
-                <a:cs typeface="Consolas" pitchFamily="49" charset="0"/>
-              </a:rPr>
-              <a:t>   LDCINT 0</a:t>
-            </a:r>
-          </a:p>
-          <a:p>
-            <a:pPr marL="274320" indent="0">
-              <a:spcBef>
-                <a:spcPts val="0"/>
-              </a:spcBef>
-              <a:buNone/>
-            </a:pPr>
-            <a:r>
-              <a:rPr lang="en-US" sz="1800" dirty="0">
-                <a:latin typeface="Consolas" pitchFamily="49" charset="0"/>
-                <a:cs typeface="Consolas" pitchFamily="49" charset="0"/>
-              </a:rPr>
-              <a:t>   BG L5</a:t>
-            </a:r>
-          </a:p>
-          <a:p>
-            <a:pPr marL="274320" indent="0">
-              <a:spcBef>
-                <a:spcPts val="0"/>
-              </a:spcBef>
-              <a:buNone/>
-            </a:pPr>
-            <a:r>
-              <a:rPr lang="en-US" sz="1800" dirty="0">
-                <a:latin typeface="Consolas" pitchFamily="49" charset="0"/>
-                <a:cs typeface="Consolas" pitchFamily="49" charset="0"/>
-              </a:rPr>
-              <a:t>   BR L4</a:t>
-            </a:r>
-          </a:p>
-          <a:p>
-            <a:pPr marL="274320" indent="0">
-              <a:spcBef>
-                <a:spcPts val="0"/>
-              </a:spcBef>
-              <a:buNone/>
-            </a:pPr>
-            <a:r>
-              <a:rPr lang="en-US" sz="1800" dirty="0">
-                <a:latin typeface="Consolas" pitchFamily="49" charset="0"/>
-                <a:cs typeface="Consolas" pitchFamily="49" charset="0"/>
-              </a:rPr>
-              <a:t>L5:</a:t>
-            </a:r>
-          </a:p>
-          <a:p>
-            <a:pPr marL="274320" indent="0">
-              <a:spcBef>
-                <a:spcPts val="0"/>
-              </a:spcBef>
-              <a:buNone/>
-            </a:pPr>
-            <a:r>
-              <a:rPr lang="en-US" sz="1800" dirty="0">
-                <a:latin typeface="Consolas" pitchFamily="49" charset="0"/>
-                <a:cs typeface="Consolas" pitchFamily="49" charset="0"/>
-              </a:rPr>
-              <a:t>   BR L9</a:t>
-            </a:r>
-          </a:p>
-          <a:p>
-            <a:pPr marL="274320" indent="0">
-              <a:spcBef>
-                <a:spcPts val="0"/>
-              </a:spcBef>
-              <a:buNone/>
-            </a:pPr>
-            <a:r>
-              <a:rPr lang="en-US" sz="1800" dirty="0">
-                <a:latin typeface="Consolas" pitchFamily="49" charset="0"/>
-                <a:cs typeface="Consolas" pitchFamily="49" charset="0"/>
-              </a:rPr>
-              <a:t>L8:</a:t>
-            </a:r>
-          </a:p>
-          <a:p>
-            <a:pPr marL="274320" indent="0">
-              <a:spcBef>
-                <a:spcPts val="0"/>
-              </a:spcBef>
-              <a:buNone/>
-            </a:pPr>
-            <a:r>
-              <a:rPr lang="en-US" sz="1800" dirty="0">
-                <a:latin typeface="Consolas" pitchFamily="49" charset="0"/>
-                <a:cs typeface="Consolas" pitchFamily="49" charset="0"/>
-              </a:rPr>
-              <a:t>   LDLADDR 0</a:t>
-            </a:r>
-          </a:p>
-          <a:p>
-            <a:pPr marL="274320" indent="0">
-              <a:spcBef>
-                <a:spcPts val="0"/>
-              </a:spcBef>
-              <a:buNone/>
-            </a:pPr>
-            <a:r>
-              <a:rPr lang="en-US" sz="1800" dirty="0">
-                <a:latin typeface="Consolas" pitchFamily="49" charset="0"/>
-                <a:cs typeface="Consolas" pitchFamily="49" charset="0"/>
-              </a:rPr>
-              <a:t>   LOADW</a:t>
-            </a:r>
-          </a:p>
-          <a:p>
-            <a:pPr marL="274320" indent="0">
-              <a:spcBef>
-                <a:spcPts val="0"/>
-              </a:spcBef>
-              <a:buNone/>
-            </a:pPr>
-            <a:r>
-              <a:rPr lang="en-US" sz="1800" dirty="0">
-                <a:latin typeface="Consolas" pitchFamily="49" charset="0"/>
-                <a:cs typeface="Consolas" pitchFamily="49" charset="0"/>
-              </a:rPr>
-              <a:t>   LDCINT 0</a:t>
-            </a:r>
-          </a:p>
-          <a:p>
-            <a:pPr marL="274320" indent="0">
-              <a:spcBef>
-                <a:spcPts val="0"/>
-              </a:spcBef>
-              <a:buNone/>
-            </a:pPr>
-            <a:r>
-              <a:rPr lang="en-US" sz="1800" dirty="0">
-                <a:latin typeface="Consolas" pitchFamily="49" charset="0"/>
-                <a:cs typeface="Consolas" pitchFamily="49" charset="0"/>
-              </a:rPr>
-              <a:t>   ...</a:t>
-            </a:r>
-          </a:p>
-        </p:txBody>
-      </p:sp>
-      <p:sp>
-        <p:nvSpPr>
-          <p:cNvPr id="4" name="Footer Placeholder 3"/>
+              <a:rPr lang="en-US" dirty="0"/>
+              <a:t>is not only faster at runtime, but in this case, it also results in smaller object code.</a:t>
+            </a:r>
+          </a:p>
+        </p:txBody>
+      </p:sp>
+      <p:sp>
+        <p:nvSpPr>
+          <p:cNvPr id="4" name="Footer Placeholder 3">
+            <a:extLst>
+              <a:ext uri="{FF2B5EF4-FFF2-40B4-BE49-F238E27FC236}">
+                <a16:creationId xmlns:a16="http://schemas.microsoft.com/office/drawing/2014/main" id="{CA44232A-2827-8FFD-9B59-74E02D459DEF}"/>
+              </a:ext>
+            </a:extLst>
+          </p:cNvPr>
           <p:cNvSpPr>
             <a:spLocks noGrp="1"/>
           </p:cNvSpPr>
@@ -6215,7 +6026,13 @@
       </p:sp>
       <p:sp>
         <p:nvSpPr>
-          <p:cNvPr id="5" name="Slide Number Placeholder 4"/>
+          <p:cNvPr id="5" name="Slide Number Placeholder 4">
+            <a:extLst>
+              <a:ext uri="{FF2B5EF4-FFF2-40B4-BE49-F238E27FC236}">
+                <a16:creationId xmlns:a16="http://schemas.microsoft.com/office/drawing/2014/main" id="{25D3FF97-F9A3-3BAF-3186-9DA7B2B8493D}"/>
+              </a:ext>
+            </a:extLst>
+          </p:cNvPr>
           <p:cNvSpPr>
             <a:spLocks noGrp="1"/>
           </p:cNvSpPr>
@@ -6241,6 +6058,1142 @@
                 <a:defRPr/>
               </a:pPr>
               <a:t>18</a:t>
+            </a:fld>
+            <a:endParaRPr lang="en-US"/>
+          </a:p>
+        </p:txBody>
+      </p:sp>
+    </p:spTree>
+    <p:extLst>
+      <p:ext uri="{BB962C8B-B14F-4D97-AF65-F5344CB8AC3E}">
+        <p14:creationId xmlns:p14="http://schemas.microsoft.com/office/powerpoint/2010/main" val="2082261563"/>
+      </p:ext>
+    </p:extLst>
+  </p:cSld>
+  <p:clrMapOvr>
+    <a:masterClrMapping/>
+  </p:clrMapOvr>
+</p:sld>
+</file>
+
+<file path=ppt/slides/slide19.xml><?xml version="1.0" encoding="utf-8"?>
+<p:sld xmlns:a="http://schemas.openxmlformats.org/drawingml/2006/main" xmlns:r="http://schemas.openxmlformats.org/officeDocument/2006/relationships" xmlns:p="http://schemas.openxmlformats.org/presentationml/2006/main">
+  <p:cSld>
+    <p:spTree>
+      <p:nvGrpSpPr>
+        <p:cNvPr id="1" name=""/>
+        <p:cNvGrpSpPr/>
+        <p:nvPr/>
+      </p:nvGrpSpPr>
+      <p:grpSpPr>
+        <a:xfrm>
+          <a:off x="0" y="0"/>
+          <a:ext cx="0" cy="0"/>
+          <a:chOff x="0" y="0"/>
+          <a:chExt cx="0" cy="0"/>
+        </a:xfrm>
+      </p:grpSpPr>
+      <p:sp>
+        <p:nvSpPr>
+          <p:cNvPr id="2" name="Title 1">
+            <a:extLst>
+              <a:ext uri="{FF2B5EF4-FFF2-40B4-BE49-F238E27FC236}">
+                <a16:creationId xmlns:a16="http://schemas.microsoft.com/office/drawing/2014/main" id="{5222A953-5729-95DA-0A13-320B87A088B1}"/>
+              </a:ext>
+            </a:extLst>
+          </p:cNvPr>
+          <p:cNvSpPr>
+            <a:spLocks noGrp="1"/>
+          </p:cNvSpPr>
+          <p:nvPr>
+            <p:ph type="title"/>
+          </p:nvPr>
+        </p:nvSpPr>
+        <p:spPr/>
+        <p:txBody>
+          <a:bodyPr/>
+          <a:lstStyle/>
+          <a:p>
+            <a:r>
+              <a:rPr lang="en-US" dirty="0"/>
+              <a:t>Branch Elimination</a:t>
+            </a:r>
+          </a:p>
+        </p:txBody>
+      </p:sp>
+      <p:sp>
+        <p:nvSpPr>
+          <p:cNvPr id="3" name="Content Placeholder 2">
+            <a:extLst>
+              <a:ext uri="{FF2B5EF4-FFF2-40B4-BE49-F238E27FC236}">
+                <a16:creationId xmlns:a16="http://schemas.microsoft.com/office/drawing/2014/main" id="{6888E3EC-B2F2-D42B-551D-DB949AFE86C5}"/>
+              </a:ext>
+            </a:extLst>
+          </p:cNvPr>
+          <p:cNvSpPr>
+            <a:spLocks noGrp="1"/>
+          </p:cNvSpPr>
+          <p:nvPr>
+            <p:ph idx="1"/>
+          </p:nvPr>
+        </p:nvSpPr>
+        <p:spPr/>
+        <p:txBody>
+          <a:bodyPr/>
+          <a:lstStyle/>
+          <a:p>
+            <a:r>
+              <a:rPr lang="en-US" dirty="0"/>
+              <a:t>Eliminate branches to other branches.</a:t>
+            </a:r>
+          </a:p>
+          <a:p>
+            <a:r>
+              <a:rPr lang="en-US" dirty="0"/>
+              <a:t>Example</a:t>
+            </a:r>
+          </a:p>
+          <a:p>
+            <a:pPr marL="0" indent="0">
+              <a:spcBef>
+                <a:spcPts val="200"/>
+              </a:spcBef>
+              <a:buNone/>
+            </a:pPr>
+            <a:r>
+              <a:rPr lang="en-US" sz="1800" dirty="0">
+                <a:latin typeface="Consolas" panose="020B0609020204030204" pitchFamily="49" charset="0"/>
+              </a:rPr>
+              <a:t>        BR L10</a:t>
+            </a:r>
+          </a:p>
+          <a:p>
+            <a:pPr marL="0" indent="0">
+              <a:spcBef>
+                <a:spcPts val="200"/>
+              </a:spcBef>
+              <a:buNone/>
+            </a:pPr>
+            <a:r>
+              <a:rPr lang="en-US" sz="1800" dirty="0">
+                <a:latin typeface="Consolas" panose="020B0609020204030204" pitchFamily="49" charset="0"/>
+              </a:rPr>
+              <a:t>        ...</a:t>
+            </a:r>
+          </a:p>
+          <a:p>
+            <a:pPr marL="0" indent="0">
+              <a:spcBef>
+                <a:spcPts val="200"/>
+              </a:spcBef>
+              <a:buNone/>
+            </a:pPr>
+            <a:r>
+              <a:rPr lang="en-US" sz="1800" dirty="0">
+                <a:latin typeface="Consolas" panose="020B0609020204030204" pitchFamily="49" charset="0"/>
+              </a:rPr>
+              <a:t>    L10:</a:t>
+            </a:r>
+          </a:p>
+          <a:p>
+            <a:pPr marL="0" indent="0">
+              <a:spcBef>
+                <a:spcPts val="200"/>
+              </a:spcBef>
+              <a:buNone/>
+            </a:pPr>
+            <a:r>
+              <a:rPr lang="en-US" sz="1800" dirty="0">
+                <a:latin typeface="Consolas" panose="020B0609020204030204" pitchFamily="49" charset="0"/>
+              </a:rPr>
+              <a:t>        BR L14</a:t>
+            </a:r>
+          </a:p>
+          <a:p>
+            <a:pPr marL="457200" lvl="1" indent="0">
+              <a:buNone/>
+            </a:pPr>
+            <a:r>
+              <a:rPr lang="en-US" dirty="0"/>
+              <a:t>Assuming that L14 is within the reachable range of the first branch instruction, we can rewrite the above as</a:t>
+            </a:r>
+          </a:p>
+          <a:p>
+            <a:pPr marL="0" indent="0">
+              <a:spcBef>
+                <a:spcPts val="200"/>
+              </a:spcBef>
+              <a:buNone/>
+            </a:pPr>
+            <a:r>
+              <a:rPr lang="en-US" sz="1800" dirty="0">
+                <a:latin typeface="Consolas" panose="020B0609020204030204" pitchFamily="49" charset="0"/>
+              </a:rPr>
+              <a:t>        BR L14</a:t>
+            </a:r>
+          </a:p>
+          <a:p>
+            <a:pPr marL="0" indent="0">
+              <a:spcBef>
+                <a:spcPts val="200"/>
+              </a:spcBef>
+              <a:buNone/>
+            </a:pPr>
+            <a:r>
+              <a:rPr lang="en-US" sz="1800" dirty="0">
+                <a:latin typeface="Consolas" panose="020B0609020204030204" pitchFamily="49" charset="0"/>
+              </a:rPr>
+              <a:t>        ...</a:t>
+            </a:r>
+          </a:p>
+          <a:p>
+            <a:pPr marL="0" indent="0">
+              <a:spcBef>
+                <a:spcPts val="200"/>
+              </a:spcBef>
+              <a:buNone/>
+            </a:pPr>
+            <a:r>
+              <a:rPr lang="en-US" sz="1800" dirty="0">
+                <a:latin typeface="Consolas" panose="020B0609020204030204" pitchFamily="49" charset="0"/>
+              </a:rPr>
+              <a:t>    L10:              // other code might still need this label</a:t>
+            </a:r>
+          </a:p>
+          <a:p>
+            <a:pPr marL="0" indent="0">
+              <a:spcBef>
+                <a:spcPts val="200"/>
+              </a:spcBef>
+              <a:buNone/>
+            </a:pPr>
+            <a:r>
+              <a:rPr lang="en-US" sz="1800" dirty="0">
+                <a:latin typeface="Consolas" panose="020B0609020204030204" pitchFamily="49" charset="0"/>
+              </a:rPr>
+              <a:t>        BR L14</a:t>
+            </a:r>
+          </a:p>
+          <a:p>
+            <a:r>
+              <a:rPr lang="en-US" dirty="0"/>
+              <a:t>See also the following slides on peephole optimization.</a:t>
+            </a:r>
+          </a:p>
+          <a:p>
+            <a:endParaRPr lang="en-US" dirty="0"/>
+          </a:p>
+          <a:p>
+            <a:pPr marL="0" indent="0">
+              <a:buNone/>
+            </a:pPr>
+            <a:endParaRPr lang="en-US" dirty="0"/>
+          </a:p>
+        </p:txBody>
+      </p:sp>
+      <p:sp>
+        <p:nvSpPr>
+          <p:cNvPr id="4" name="Footer Placeholder 3">
+            <a:extLst>
+              <a:ext uri="{FF2B5EF4-FFF2-40B4-BE49-F238E27FC236}">
+                <a16:creationId xmlns:a16="http://schemas.microsoft.com/office/drawing/2014/main" id="{9352CF4F-FE0A-E569-8418-A310C12763D2}"/>
+              </a:ext>
+            </a:extLst>
+          </p:cNvPr>
+          <p:cNvSpPr>
+            <a:spLocks noGrp="1"/>
+          </p:cNvSpPr>
+          <p:nvPr>
+            <p:ph type="ftr" sz="quarter" idx="10"/>
+          </p:nvPr>
+        </p:nvSpPr>
+        <p:spPr/>
+        <p:txBody>
+          <a:bodyPr/>
+          <a:lstStyle/>
+          <a:p>
+            <a:pPr>
+              <a:defRPr/>
+            </a:pPr>
+            <a:r>
+              <a:rPr lang="en-US"/>
+              <a:t>©SoftMoore Consulting</a:t>
+            </a:r>
+          </a:p>
+        </p:txBody>
+      </p:sp>
+      <p:sp>
+        <p:nvSpPr>
+          <p:cNvPr id="5" name="Slide Number Placeholder 4">
+            <a:extLst>
+              <a:ext uri="{FF2B5EF4-FFF2-40B4-BE49-F238E27FC236}">
+                <a16:creationId xmlns:a16="http://schemas.microsoft.com/office/drawing/2014/main" id="{3265B640-410E-04EE-8CF2-444BEFB47700}"/>
+              </a:ext>
+            </a:extLst>
+          </p:cNvPr>
+          <p:cNvSpPr>
+            <a:spLocks noGrp="1"/>
+          </p:cNvSpPr>
+          <p:nvPr>
+            <p:ph type="sldNum" sz="quarter" idx="11"/>
+          </p:nvPr>
+        </p:nvSpPr>
+        <p:spPr/>
+        <p:txBody>
+          <a:bodyPr/>
+          <a:lstStyle/>
+          <a:p>
+            <a:pPr>
+              <a:defRPr/>
+            </a:pPr>
+            <a:r>
+              <a:rPr lang="en-US"/>
+              <a:t>Slide </a:t>
+            </a:r>
+            <a:fld id="{CD33D74D-A874-47AE-8B06-6763BD644256}" type="slidenum">
+              <a:rPr lang="en-US" smtClean="0"/>
+              <a:pPr>
+                <a:defRPr/>
+              </a:pPr>
+              <a:t>19</a:t>
+            </a:fld>
+            <a:endParaRPr lang="en-US"/>
+          </a:p>
+        </p:txBody>
+      </p:sp>
+    </p:spTree>
+    <p:extLst>
+      <p:ext uri="{BB962C8B-B14F-4D97-AF65-F5344CB8AC3E}">
+        <p14:creationId xmlns:p14="http://schemas.microsoft.com/office/powerpoint/2010/main" val="1217562167"/>
+      </p:ext>
+    </p:extLst>
+  </p:cSld>
+  <p:clrMapOvr>
+    <a:masterClrMapping/>
+  </p:clrMapOvr>
+</p:sld>
+</file>
+
+<file path=ppt/slides/slide2.xml><?xml version="1.0" encoding="utf-8"?>
+<p:sld xmlns:a="http://schemas.openxmlformats.org/drawingml/2006/main" xmlns:r="http://schemas.openxmlformats.org/officeDocument/2006/relationships" xmlns:p="http://schemas.openxmlformats.org/presentationml/2006/main">
+  <p:cSld>
+    <p:spTree>
+      <p:nvGrpSpPr>
+        <p:cNvPr id="1" name=""/>
+        <p:cNvGrpSpPr/>
+        <p:nvPr/>
+      </p:nvGrpSpPr>
+      <p:grpSpPr>
+        <a:xfrm>
+          <a:off x="0" y="0"/>
+          <a:ext cx="0" cy="0"/>
+          <a:chOff x="0" y="0"/>
+          <a:chExt cx="0" cy="0"/>
+        </a:xfrm>
+      </p:grpSpPr>
+      <p:sp>
+        <p:nvSpPr>
+          <p:cNvPr id="4098" name="Footer Placeholder 3"/>
+          <p:cNvSpPr>
+            <a:spLocks noGrp="1"/>
+          </p:cNvSpPr>
+          <p:nvPr>
+            <p:ph type="ftr" sz="quarter" idx="10"/>
+          </p:nvPr>
+        </p:nvSpPr>
+        <p:spPr>
+          <a:noFill/>
+        </p:spPr>
+        <p:txBody>
+          <a:bodyPr/>
+          <a:lstStyle/>
+          <a:p>
+            <a:r>
+              <a:rPr lang="en-US"/>
+              <a:t>©SoftMoore Consulting</a:t>
+            </a:r>
+          </a:p>
+        </p:txBody>
+      </p:sp>
+      <p:sp>
+        <p:nvSpPr>
+          <p:cNvPr id="4099" name="Slide Number Placeholder 4"/>
+          <p:cNvSpPr>
+            <a:spLocks noGrp="1"/>
+          </p:cNvSpPr>
+          <p:nvPr>
+            <p:ph type="sldNum" sz="quarter" idx="11"/>
+          </p:nvPr>
+        </p:nvSpPr>
+        <p:spPr>
+          <a:noFill/>
+        </p:spPr>
+        <p:txBody>
+          <a:bodyPr/>
+          <a:lstStyle/>
+          <a:p>
+            <a:r>
+              <a:rPr lang="en-US"/>
+              <a:t>Slide </a:t>
+            </a:r>
+            <a:fld id="{24B8238C-0742-4F84-9EEA-A97E2EE10F8D}" type="slidenum">
+              <a:rPr lang="en-US" smtClean="0"/>
+              <a:pPr/>
+              <a:t>2</a:t>
+            </a:fld>
+            <a:endParaRPr lang="en-US"/>
+          </a:p>
+        </p:txBody>
+      </p:sp>
+      <p:sp>
+        <p:nvSpPr>
+          <p:cNvPr id="4100" name="Rectangle 2"/>
+          <p:cNvSpPr>
+            <a:spLocks noGrp="1" noChangeArrowheads="1"/>
+          </p:cNvSpPr>
+          <p:nvPr>
+            <p:ph type="title"/>
+          </p:nvPr>
+        </p:nvSpPr>
+        <p:spPr/>
+        <p:txBody>
+          <a:bodyPr/>
+          <a:lstStyle/>
+          <a:p>
+            <a:r>
+              <a:rPr lang="en-US"/>
+              <a:t>Code Optimization</a:t>
+            </a:r>
+          </a:p>
+        </p:txBody>
+      </p:sp>
+      <p:sp>
+        <p:nvSpPr>
+          <p:cNvPr id="4101" name="Rectangle 3"/>
+          <p:cNvSpPr>
+            <a:spLocks noGrp="1" noChangeArrowheads="1"/>
+          </p:cNvSpPr>
+          <p:nvPr>
+            <p:ph type="body" idx="1"/>
+          </p:nvPr>
+        </p:nvSpPr>
+        <p:spPr/>
+        <p:txBody>
+          <a:bodyPr/>
+          <a:lstStyle/>
+          <a:p>
+            <a:r>
+              <a:rPr lang="en-US" dirty="0"/>
+              <a:t>Code optimization refers to code generation techniques and transformations that result in a semantically equivalent program that runs more efficiently.</a:t>
+            </a:r>
+          </a:p>
+          <a:p>
+            <a:pPr lvl="1"/>
+            <a:r>
+              <a:rPr lang="en-US" dirty="0"/>
+              <a:t>faster</a:t>
+            </a:r>
+          </a:p>
+          <a:p>
+            <a:pPr lvl="1"/>
+            <a:r>
+              <a:rPr lang="en-US" dirty="0"/>
+              <a:t>uses less memory</a:t>
+            </a:r>
+          </a:p>
+          <a:p>
+            <a:pPr lvl="1"/>
+            <a:r>
+              <a:rPr lang="en-US" dirty="0"/>
+              <a:t>or both</a:t>
+            </a:r>
+          </a:p>
+          <a:p>
+            <a:r>
+              <a:rPr lang="en-US" dirty="0"/>
+              <a:t>Often involves a time-space tradeoff.  Techniques that make the code faster often require additional memory, and conversely</a:t>
+            </a:r>
+          </a:p>
+          <a:p>
+            <a:r>
+              <a:rPr lang="en-US" dirty="0"/>
+              <a:t>Term “optimization” is actually used improperly</a:t>
+            </a:r>
+          </a:p>
+          <a:p>
+            <a:pPr lvl="1"/>
+            <a:r>
+              <a:rPr lang="en-US" dirty="0"/>
+              <a:t>generated code is rarely optimal</a:t>
+            </a:r>
+          </a:p>
+          <a:p>
+            <a:pPr lvl="1"/>
+            <a:r>
+              <a:rPr lang="en-US" dirty="0"/>
+              <a:t>better name might be “code improvements”</a:t>
+            </a:r>
+          </a:p>
+        </p:txBody>
+      </p:sp>
+    </p:spTree>
+  </p:cSld>
+  <p:clrMapOvr>
+    <a:masterClrMapping/>
+  </p:clrMapOvr>
+</p:sld>
+</file>
+
+<file path=ppt/slides/slide20.xml><?xml version="1.0" encoding="utf-8"?>
+<p:sld xmlns:a="http://schemas.openxmlformats.org/drawingml/2006/main" xmlns:r="http://schemas.openxmlformats.org/officeDocument/2006/relationships" xmlns:p="http://schemas.openxmlformats.org/presentationml/2006/main">
+  <p:cSld>
+    <p:spTree>
+      <p:nvGrpSpPr>
+        <p:cNvPr id="1" name=""/>
+        <p:cNvGrpSpPr/>
+        <p:nvPr/>
+      </p:nvGrpSpPr>
+      <p:grpSpPr>
+        <a:xfrm>
+          <a:off x="0" y="0"/>
+          <a:ext cx="0" cy="0"/>
+          <a:chOff x="0" y="0"/>
+          <a:chExt cx="0" cy="0"/>
+        </a:xfrm>
+      </p:grpSpPr>
+      <p:sp>
+        <p:nvSpPr>
+          <p:cNvPr id="2" name="Title 1"/>
+          <p:cNvSpPr>
+            <a:spLocks noGrp="1"/>
+          </p:cNvSpPr>
+          <p:nvPr>
+            <p:ph type="title"/>
+          </p:nvPr>
+        </p:nvSpPr>
+        <p:spPr/>
+        <p:txBody>
+          <a:bodyPr/>
+          <a:lstStyle/>
+          <a:p>
+            <a:r>
+              <a:rPr lang="en-US" dirty="0"/>
+              <a:t>Peephole Optimization</a:t>
+            </a:r>
+          </a:p>
+        </p:txBody>
+      </p:sp>
+      <p:sp>
+        <p:nvSpPr>
+          <p:cNvPr id="3" name="Content Placeholder 2"/>
+          <p:cNvSpPr>
+            <a:spLocks noGrp="1"/>
+          </p:cNvSpPr>
+          <p:nvPr>
+            <p:ph idx="1"/>
+          </p:nvPr>
+        </p:nvSpPr>
+        <p:spPr/>
+        <p:txBody>
+          <a:bodyPr/>
+          <a:lstStyle/>
+          <a:p>
+            <a:r>
+              <a:rPr lang="en-US" dirty="0"/>
+              <a:t>Applied to the generated target machine code or a</a:t>
+            </a:r>
+            <a:br>
+              <a:rPr lang="en-US" dirty="0"/>
+            </a:br>
+            <a:r>
+              <a:rPr lang="en-US" dirty="0"/>
+              <a:t>low-level intermediate representation.</a:t>
+            </a:r>
+          </a:p>
+          <a:p>
+            <a:r>
+              <a:rPr lang="en-US" dirty="0"/>
+              <a:t>Basic idea: Analyze a small sequence of instructions at a time (the peephole) for possible performance improvements.</a:t>
+            </a:r>
+          </a:p>
+          <a:p>
+            <a:r>
+              <a:rPr lang="en-US" dirty="0"/>
+              <a:t>The peephole is a small window into the generated code.</a:t>
+            </a:r>
+          </a:p>
+          <a:p>
+            <a:r>
+              <a:rPr lang="en-US" dirty="0"/>
+              <a:t>Examples of peephole optimizations</a:t>
+            </a:r>
+          </a:p>
+          <a:p>
+            <a:pPr lvl="1"/>
+            <a:r>
+              <a:rPr lang="en-US" dirty="0"/>
+              <a:t>elimination of redundant loads and stores</a:t>
+            </a:r>
+          </a:p>
+          <a:p>
+            <a:pPr lvl="1"/>
+            <a:r>
+              <a:rPr lang="en-US" dirty="0"/>
+              <a:t>elimination of branch instructions to other branch instructions</a:t>
+            </a:r>
+          </a:p>
+          <a:p>
+            <a:pPr lvl="1"/>
+            <a:r>
+              <a:rPr lang="en-US" dirty="0"/>
+              <a:t>algebraic identities and strength reduction</a:t>
+            </a:r>
+          </a:p>
+          <a:p>
+            <a:pPr lvl="2">
+              <a:buNone/>
+            </a:pPr>
+            <a:r>
+              <a:rPr lang="en-US" dirty="0"/>
+              <a:t>(can be easier to detect in the target machine code)</a:t>
+            </a:r>
+          </a:p>
+        </p:txBody>
+      </p:sp>
+      <p:sp>
+        <p:nvSpPr>
+          <p:cNvPr id="4" name="Footer Placeholder 3"/>
+          <p:cNvSpPr>
+            <a:spLocks noGrp="1"/>
+          </p:cNvSpPr>
+          <p:nvPr>
+            <p:ph type="ftr" sz="quarter" idx="10"/>
+          </p:nvPr>
+        </p:nvSpPr>
+        <p:spPr/>
+        <p:txBody>
+          <a:bodyPr/>
+          <a:lstStyle/>
+          <a:p>
+            <a:pPr>
+              <a:defRPr/>
+            </a:pPr>
+            <a:r>
+              <a:rPr lang="en-US"/>
+              <a:t>©SoftMoore Consulting</a:t>
+            </a:r>
+          </a:p>
+        </p:txBody>
+      </p:sp>
+      <p:sp>
+        <p:nvSpPr>
+          <p:cNvPr id="5" name="Slide Number Placeholder 4"/>
+          <p:cNvSpPr>
+            <a:spLocks noGrp="1"/>
+          </p:cNvSpPr>
+          <p:nvPr>
+            <p:ph type="sldNum" sz="quarter" idx="11"/>
+          </p:nvPr>
+        </p:nvSpPr>
+        <p:spPr/>
+        <p:txBody>
+          <a:bodyPr/>
+          <a:lstStyle/>
+          <a:p>
+            <a:pPr>
+              <a:defRPr/>
+            </a:pPr>
+            <a:r>
+              <a:rPr lang="en-US"/>
+              <a:t>Slide </a:t>
+            </a:r>
+            <a:fld id="{CD33D74D-A874-47AE-8B06-6763BD644256}" type="slidenum">
+              <a:rPr lang="en-US" smtClean="0"/>
+              <a:pPr>
+                <a:defRPr/>
+              </a:pPr>
+              <a:t>20</a:t>
+            </a:fld>
+            <a:endParaRPr lang="en-US"/>
+          </a:p>
+        </p:txBody>
+      </p:sp>
+    </p:spTree>
+  </p:cSld>
+  <p:clrMapOvr>
+    <a:masterClrMapping/>
+  </p:clrMapOvr>
+</p:sld>
+</file>
+
+<file path=ppt/slides/slide21.xml><?xml version="1.0" encoding="utf-8"?>
+<p:sld xmlns:a="http://schemas.openxmlformats.org/drawingml/2006/main" xmlns:r="http://schemas.openxmlformats.org/officeDocument/2006/relationships" xmlns:p="http://schemas.openxmlformats.org/presentationml/2006/main">
+  <p:cSld>
+    <p:spTree>
+      <p:nvGrpSpPr>
+        <p:cNvPr id="1" name=""/>
+        <p:cNvGrpSpPr/>
+        <p:nvPr/>
+      </p:nvGrpSpPr>
+      <p:grpSpPr>
+        <a:xfrm>
+          <a:off x="0" y="0"/>
+          <a:ext cx="0" cy="0"/>
+          <a:chOff x="0" y="0"/>
+          <a:chExt cx="0" cy="0"/>
+        </a:xfrm>
+      </p:grpSpPr>
+      <p:sp>
+        <p:nvSpPr>
+          <p:cNvPr id="2" name="Title 1"/>
+          <p:cNvSpPr>
+            <a:spLocks noGrp="1"/>
+          </p:cNvSpPr>
+          <p:nvPr>
+            <p:ph type="title"/>
+          </p:nvPr>
+        </p:nvSpPr>
+        <p:spPr/>
+        <p:txBody>
+          <a:bodyPr/>
+          <a:lstStyle/>
+          <a:p>
+            <a:r>
+              <a:rPr lang="en-US" dirty="0"/>
+              <a:t>Example: Peephole Optimization</a:t>
+            </a:r>
+            <a:endParaRPr lang="en-US" sz="2800" dirty="0"/>
+          </a:p>
+        </p:txBody>
+      </p:sp>
+      <p:sp>
+        <p:nvSpPr>
+          <p:cNvPr id="3" name="Content Placeholder 2"/>
+          <p:cNvSpPr>
+            <a:spLocks noGrp="1"/>
+          </p:cNvSpPr>
+          <p:nvPr>
+            <p:ph sz="half" idx="1"/>
+          </p:nvPr>
+        </p:nvSpPr>
+        <p:spPr/>
+        <p:txBody>
+          <a:bodyPr/>
+          <a:lstStyle/>
+          <a:p>
+            <a:pPr marL="274320" indent="0">
+              <a:spcBef>
+                <a:spcPts val="0"/>
+              </a:spcBef>
+              <a:buNone/>
+            </a:pPr>
+            <a:r>
+              <a:rPr lang="en-US" sz="2000" b="1" dirty="0">
+                <a:cs typeface="Consolas" pitchFamily="49" charset="0"/>
+              </a:rPr>
+              <a:t>Source Code</a:t>
+            </a:r>
+          </a:p>
+          <a:p>
+            <a:pPr marL="274320" indent="0">
+              <a:spcBef>
+                <a:spcPts val="0"/>
+              </a:spcBef>
+              <a:buNone/>
+            </a:pPr>
+            <a:r>
+              <a:rPr lang="en-US" sz="1800" dirty="0">
+                <a:latin typeface="Consolas" pitchFamily="49" charset="0"/>
+                <a:cs typeface="Consolas" pitchFamily="49" charset="0"/>
+              </a:rPr>
+              <a:t>...</a:t>
+            </a:r>
+          </a:p>
+          <a:p>
+            <a:pPr marL="274320" indent="0">
+              <a:spcBef>
+                <a:spcPts val="0"/>
+              </a:spcBef>
+              <a:buNone/>
+            </a:pPr>
+            <a:r>
+              <a:rPr lang="en-US" sz="1800" dirty="0">
+                <a:latin typeface="Consolas" pitchFamily="49" charset="0"/>
+                <a:cs typeface="Consolas" pitchFamily="49" charset="0"/>
+              </a:rPr>
+              <a:t>loop</a:t>
+            </a:r>
+          </a:p>
+          <a:p>
+            <a:pPr marL="274320" indent="0">
+              <a:spcBef>
+                <a:spcPts val="0"/>
+              </a:spcBef>
+              <a:buNone/>
+            </a:pPr>
+            <a:r>
+              <a:rPr lang="en-US" sz="1800" dirty="0">
+                <a:latin typeface="Consolas" pitchFamily="49" charset="0"/>
+                <a:cs typeface="Consolas" pitchFamily="49" charset="0"/>
+              </a:rPr>
+              <a:t>  {</a:t>
+            </a:r>
+          </a:p>
+          <a:p>
+            <a:pPr marL="274320" indent="0">
+              <a:spcBef>
+                <a:spcPts val="0"/>
+              </a:spcBef>
+              <a:buNone/>
+            </a:pPr>
+            <a:r>
+              <a:rPr lang="en-US" sz="1800" dirty="0">
+                <a:latin typeface="Consolas" pitchFamily="49" charset="0"/>
+                <a:cs typeface="Consolas" pitchFamily="49" charset="0"/>
+              </a:rPr>
+              <a:t>    ...</a:t>
+            </a:r>
+          </a:p>
+          <a:p>
+            <a:pPr marL="274320" indent="0">
+              <a:spcBef>
+                <a:spcPts val="0"/>
+              </a:spcBef>
+              <a:buNone/>
+            </a:pPr>
+            <a:r>
+              <a:rPr lang="en-US" sz="1800" dirty="0">
+                <a:latin typeface="Consolas" pitchFamily="49" charset="0"/>
+                <a:cs typeface="Consolas" pitchFamily="49" charset="0"/>
+              </a:rPr>
+              <a:t>    exit when x &gt; 0;</a:t>
+            </a:r>
+          </a:p>
+          <a:p>
+            <a:pPr marL="274320" indent="0">
+              <a:spcBef>
+                <a:spcPts val="0"/>
+              </a:spcBef>
+              <a:buNone/>
+            </a:pPr>
+            <a:r>
+              <a:rPr lang="en-US" sz="1800" dirty="0">
+                <a:latin typeface="Consolas" pitchFamily="49" charset="0"/>
+                <a:cs typeface="Consolas" pitchFamily="49" charset="0"/>
+              </a:rPr>
+              <a:t>  }</a:t>
+            </a:r>
+          </a:p>
+          <a:p>
+            <a:pPr marL="274320" indent="0">
+              <a:spcBef>
+                <a:spcPts val="0"/>
+              </a:spcBef>
+              <a:buNone/>
+            </a:pPr>
+            <a:r>
+              <a:rPr lang="en-US" sz="1800" dirty="0">
+                <a:latin typeface="Consolas" pitchFamily="49" charset="0"/>
+                <a:cs typeface="Consolas" pitchFamily="49" charset="0"/>
+              </a:rPr>
+              <a:t>...</a:t>
+            </a:r>
+          </a:p>
+        </p:txBody>
+      </p:sp>
+      <p:sp>
+        <p:nvSpPr>
+          <p:cNvPr id="9" name="Content Placeholder 8"/>
+          <p:cNvSpPr>
+            <a:spLocks noGrp="1"/>
+          </p:cNvSpPr>
+          <p:nvPr>
+            <p:ph sz="half" idx="2"/>
+          </p:nvPr>
+        </p:nvSpPr>
+        <p:spPr/>
+        <p:txBody>
+          <a:bodyPr/>
+          <a:lstStyle/>
+          <a:p>
+            <a:pPr marL="274320" indent="0">
+              <a:spcBef>
+                <a:spcPts val="0"/>
+              </a:spcBef>
+              <a:buNone/>
+            </a:pPr>
+            <a:r>
+              <a:rPr lang="en-US" sz="2000" b="1" dirty="0">
+                <a:cs typeface="Consolas" pitchFamily="49" charset="0"/>
+              </a:rPr>
+              <a:t>Target Code</a:t>
+            </a:r>
+          </a:p>
+          <a:p>
+            <a:pPr marL="274320" indent="0">
+              <a:spcBef>
+                <a:spcPts val="0"/>
+              </a:spcBef>
+              <a:buNone/>
+            </a:pPr>
+            <a:r>
+              <a:rPr lang="en-US" sz="1800" dirty="0">
+                <a:latin typeface="Consolas" pitchFamily="49" charset="0"/>
+                <a:cs typeface="Consolas" pitchFamily="49" charset="0"/>
+              </a:rPr>
+              <a:t>L4:   </a:t>
+            </a:r>
+          </a:p>
+          <a:p>
+            <a:pPr marL="274320" indent="0">
+              <a:spcBef>
+                <a:spcPts val="0"/>
+              </a:spcBef>
+              <a:buNone/>
+            </a:pPr>
+            <a:r>
+              <a:rPr lang="en-US" sz="1800" dirty="0">
+                <a:latin typeface="Consolas" pitchFamily="49" charset="0"/>
+                <a:cs typeface="Consolas" pitchFamily="49" charset="0"/>
+              </a:rPr>
+              <a:t>   ...</a:t>
+            </a:r>
+          </a:p>
+          <a:p>
+            <a:pPr marL="274320" indent="0">
+              <a:spcBef>
+                <a:spcPts val="0"/>
+              </a:spcBef>
+              <a:buNone/>
+            </a:pPr>
+            <a:r>
+              <a:rPr lang="en-US" sz="1800" dirty="0">
+                <a:latin typeface="Consolas" pitchFamily="49" charset="0"/>
+                <a:cs typeface="Consolas" pitchFamily="49" charset="0"/>
+              </a:rPr>
+              <a:t>   LDLADDR 0</a:t>
+            </a:r>
+          </a:p>
+          <a:p>
+            <a:pPr marL="274320" indent="0">
+              <a:spcBef>
+                <a:spcPts val="0"/>
+              </a:spcBef>
+              <a:buNone/>
+            </a:pPr>
+            <a:r>
+              <a:rPr lang="en-US" sz="1800" dirty="0">
+                <a:latin typeface="Consolas" pitchFamily="49" charset="0"/>
+                <a:cs typeface="Consolas" pitchFamily="49" charset="0"/>
+              </a:rPr>
+              <a:t>   LOADW</a:t>
+            </a:r>
+          </a:p>
+          <a:p>
+            <a:pPr marL="274320" indent="0">
+              <a:spcBef>
+                <a:spcPts val="0"/>
+              </a:spcBef>
+              <a:buNone/>
+            </a:pPr>
+            <a:r>
+              <a:rPr lang="en-US" sz="1800" dirty="0">
+                <a:latin typeface="Consolas" pitchFamily="49" charset="0"/>
+                <a:cs typeface="Consolas" pitchFamily="49" charset="0"/>
+              </a:rPr>
+              <a:t>   LDCINT 0</a:t>
+            </a:r>
+          </a:p>
+          <a:p>
+            <a:pPr marL="274320" indent="0">
+              <a:spcBef>
+                <a:spcPts val="0"/>
+              </a:spcBef>
+              <a:buNone/>
+            </a:pPr>
+            <a:r>
+              <a:rPr lang="en-US" sz="1800" dirty="0">
+                <a:latin typeface="Consolas" pitchFamily="49" charset="0"/>
+                <a:cs typeface="Consolas" pitchFamily="49" charset="0"/>
+              </a:rPr>
+              <a:t>   BG L5</a:t>
+            </a:r>
+          </a:p>
+          <a:p>
+            <a:pPr marL="274320" indent="0">
+              <a:spcBef>
+                <a:spcPts val="0"/>
+              </a:spcBef>
+              <a:buNone/>
+            </a:pPr>
+            <a:r>
+              <a:rPr lang="en-US" sz="1800" dirty="0">
+                <a:latin typeface="Consolas" pitchFamily="49" charset="0"/>
+                <a:cs typeface="Consolas" pitchFamily="49" charset="0"/>
+              </a:rPr>
+              <a:t>   BR L4</a:t>
+            </a:r>
+          </a:p>
+          <a:p>
+            <a:pPr marL="274320" indent="0">
+              <a:spcBef>
+                <a:spcPts val="0"/>
+              </a:spcBef>
+              <a:buNone/>
+            </a:pPr>
+            <a:r>
+              <a:rPr lang="en-US" sz="1800" dirty="0">
+                <a:latin typeface="Consolas" pitchFamily="49" charset="0"/>
+                <a:cs typeface="Consolas" pitchFamily="49" charset="0"/>
+              </a:rPr>
+              <a:t>L5:</a:t>
+            </a:r>
+          </a:p>
+          <a:p>
+            <a:pPr marL="274320" indent="0">
+              <a:spcBef>
+                <a:spcPts val="0"/>
+              </a:spcBef>
+              <a:buNone/>
+            </a:pPr>
+            <a:r>
+              <a:rPr lang="en-US" sz="1800" dirty="0">
+                <a:latin typeface="Consolas" pitchFamily="49" charset="0"/>
+                <a:cs typeface="Consolas" pitchFamily="49" charset="0"/>
+              </a:rPr>
+              <a:t>   BR L9</a:t>
+            </a:r>
+          </a:p>
+          <a:p>
+            <a:pPr marL="274320" indent="0">
+              <a:spcBef>
+                <a:spcPts val="0"/>
+              </a:spcBef>
+              <a:buNone/>
+            </a:pPr>
+            <a:r>
+              <a:rPr lang="en-US" sz="1800" dirty="0">
+                <a:latin typeface="Consolas" pitchFamily="49" charset="0"/>
+                <a:cs typeface="Consolas" pitchFamily="49" charset="0"/>
+              </a:rPr>
+              <a:t>L8:</a:t>
+            </a:r>
+          </a:p>
+          <a:p>
+            <a:pPr marL="274320" indent="0">
+              <a:spcBef>
+                <a:spcPts val="0"/>
+              </a:spcBef>
+              <a:buNone/>
+            </a:pPr>
+            <a:r>
+              <a:rPr lang="en-US" sz="1800" dirty="0">
+                <a:latin typeface="Consolas" pitchFamily="49" charset="0"/>
+                <a:cs typeface="Consolas" pitchFamily="49" charset="0"/>
+              </a:rPr>
+              <a:t>   LDLADDR 0</a:t>
+            </a:r>
+          </a:p>
+          <a:p>
+            <a:pPr marL="274320" indent="0">
+              <a:spcBef>
+                <a:spcPts val="0"/>
+              </a:spcBef>
+              <a:buNone/>
+            </a:pPr>
+            <a:r>
+              <a:rPr lang="en-US" sz="1800" dirty="0">
+                <a:latin typeface="Consolas" pitchFamily="49" charset="0"/>
+                <a:cs typeface="Consolas" pitchFamily="49" charset="0"/>
+              </a:rPr>
+              <a:t>   LOADW</a:t>
+            </a:r>
+          </a:p>
+          <a:p>
+            <a:pPr marL="274320" indent="0">
+              <a:spcBef>
+                <a:spcPts val="0"/>
+              </a:spcBef>
+              <a:buNone/>
+            </a:pPr>
+            <a:r>
+              <a:rPr lang="en-US" sz="1800" dirty="0">
+                <a:latin typeface="Consolas" pitchFamily="49" charset="0"/>
+                <a:cs typeface="Consolas" pitchFamily="49" charset="0"/>
+              </a:rPr>
+              <a:t>   LDCINT 0</a:t>
+            </a:r>
+          </a:p>
+          <a:p>
+            <a:pPr marL="274320" indent="0">
+              <a:spcBef>
+                <a:spcPts val="0"/>
+              </a:spcBef>
+              <a:buNone/>
+            </a:pPr>
+            <a:r>
+              <a:rPr lang="en-US" sz="1800" dirty="0">
+                <a:latin typeface="Consolas" pitchFamily="49" charset="0"/>
+                <a:cs typeface="Consolas" pitchFamily="49" charset="0"/>
+              </a:rPr>
+              <a:t>   ...</a:t>
+            </a:r>
+          </a:p>
+        </p:txBody>
+      </p:sp>
+      <p:sp>
+        <p:nvSpPr>
+          <p:cNvPr id="4" name="Footer Placeholder 3"/>
+          <p:cNvSpPr>
+            <a:spLocks noGrp="1"/>
+          </p:cNvSpPr>
+          <p:nvPr>
+            <p:ph type="ftr" sz="quarter" idx="10"/>
+          </p:nvPr>
+        </p:nvSpPr>
+        <p:spPr/>
+        <p:txBody>
+          <a:bodyPr/>
+          <a:lstStyle/>
+          <a:p>
+            <a:pPr>
+              <a:defRPr/>
+            </a:pPr>
+            <a:r>
+              <a:rPr lang="en-US"/>
+              <a:t>©SoftMoore Consulting</a:t>
+            </a:r>
+          </a:p>
+        </p:txBody>
+      </p:sp>
+      <p:sp>
+        <p:nvSpPr>
+          <p:cNvPr id="5" name="Slide Number Placeholder 4"/>
+          <p:cNvSpPr>
+            <a:spLocks noGrp="1"/>
+          </p:cNvSpPr>
+          <p:nvPr>
+            <p:ph type="sldNum" sz="quarter" idx="11"/>
+          </p:nvPr>
+        </p:nvSpPr>
+        <p:spPr/>
+        <p:txBody>
+          <a:bodyPr/>
+          <a:lstStyle/>
+          <a:p>
+            <a:pPr>
+              <a:defRPr/>
+            </a:pPr>
+            <a:r>
+              <a:rPr lang="en-US"/>
+              <a:t>Slide </a:t>
+            </a:r>
+            <a:fld id="{CD33D74D-A874-47AE-8B06-6763BD644256}" type="slidenum">
+              <a:rPr lang="en-US" smtClean="0"/>
+              <a:pPr>
+                <a:defRPr/>
+              </a:pPr>
+              <a:t>21</a:t>
             </a:fld>
             <a:endParaRPr lang="en-US"/>
           </a:p>
@@ -6538,7 +7491,7 @@
 </p:sld>
 </file>
 
-<file path=ppt/slides/slide19.xml><?xml version="1.0" encoding="utf-8"?>
+<file path=ppt/slides/slide22.xml><?xml version="1.0" encoding="utf-8"?>
 <p:sld xmlns:a="http://schemas.openxmlformats.org/drawingml/2006/main" xmlns:r="http://schemas.openxmlformats.org/officeDocument/2006/relationships" xmlns:p="http://schemas.openxmlformats.org/presentationml/2006/main">
   <p:cSld>
     <p:spTree>
@@ -6679,13 +7632,6 @@
             <a:pPr lvl="1"/>
             <a:r>
               <a:rPr lang="en-US" sz="1900" dirty="0"/>
-              <a:t>use left (right) shift instead of multiplying (dividing) by powers of 2</a:t>
-            </a:r>
-          </a:p>
-          <a:p>
-            <a:pPr lvl="1"/>
-            <a:r>
-              <a:rPr lang="en-US" sz="1900" dirty="0"/>
               <a:t>use special constant instructions </a:t>
             </a:r>
             <a:r>
@@ -6797,7 +7743,7 @@
               <a:pPr>
                 <a:defRPr/>
               </a:pPr>
-              <a:t>19</a:t>
+              <a:t>22</a:t>
             </a:fld>
             <a:endParaRPr lang="en-US"/>
           </a:p>
@@ -6809,176 +7755,6 @@
         <p14:creationId xmlns:p14="http://schemas.microsoft.com/office/powerpoint/2010/main" val="918515077"/>
       </p:ext>
     </p:extLst>
-  </p:cSld>
-  <p:clrMapOvr>
-    <a:masterClrMapping/>
-  </p:clrMapOvr>
-</p:sld>
-</file>
-
-<file path=ppt/slides/slide2.xml><?xml version="1.0" encoding="utf-8"?>
-<p:sld xmlns:a="http://schemas.openxmlformats.org/drawingml/2006/main" xmlns:r="http://schemas.openxmlformats.org/officeDocument/2006/relationships" xmlns:p="http://schemas.openxmlformats.org/presentationml/2006/main">
-  <p:cSld>
-    <p:spTree>
-      <p:nvGrpSpPr>
-        <p:cNvPr id="1" name=""/>
-        <p:cNvGrpSpPr/>
-        <p:nvPr/>
-      </p:nvGrpSpPr>
-      <p:grpSpPr>
-        <a:xfrm>
-          <a:off x="0" y="0"/>
-          <a:ext cx="0" cy="0"/>
-          <a:chOff x="0" y="0"/>
-          <a:chExt cx="0" cy="0"/>
-        </a:xfrm>
-      </p:grpSpPr>
-      <p:sp>
-        <p:nvSpPr>
-          <p:cNvPr id="4098" name="Footer Placeholder 3"/>
-          <p:cNvSpPr>
-            <a:spLocks noGrp="1"/>
-          </p:cNvSpPr>
-          <p:nvPr>
-            <p:ph type="ftr" sz="quarter" idx="10"/>
-          </p:nvPr>
-        </p:nvSpPr>
-        <p:spPr>
-          <a:noFill/>
-        </p:spPr>
-        <p:txBody>
-          <a:bodyPr/>
-          <a:lstStyle/>
-          <a:p>
-            <a:r>
-              <a:rPr lang="en-US"/>
-              <a:t>©SoftMoore Consulting</a:t>
-            </a:r>
-          </a:p>
-        </p:txBody>
-      </p:sp>
-      <p:sp>
-        <p:nvSpPr>
-          <p:cNvPr id="4099" name="Slide Number Placeholder 4"/>
-          <p:cNvSpPr>
-            <a:spLocks noGrp="1"/>
-          </p:cNvSpPr>
-          <p:nvPr>
-            <p:ph type="sldNum" sz="quarter" idx="11"/>
-          </p:nvPr>
-        </p:nvSpPr>
-        <p:spPr>
-          <a:noFill/>
-        </p:spPr>
-        <p:txBody>
-          <a:bodyPr/>
-          <a:lstStyle/>
-          <a:p>
-            <a:r>
-              <a:rPr lang="en-US"/>
-              <a:t>Slide </a:t>
-            </a:r>
-            <a:fld id="{24B8238C-0742-4F84-9EEA-A97E2EE10F8D}" type="slidenum">
-              <a:rPr lang="en-US" smtClean="0"/>
-              <a:pPr/>
-              <a:t>2</a:t>
-            </a:fld>
-            <a:endParaRPr lang="en-US"/>
-          </a:p>
-        </p:txBody>
-      </p:sp>
-      <p:sp>
-        <p:nvSpPr>
-          <p:cNvPr id="4100" name="Rectangle 2"/>
-          <p:cNvSpPr>
-            <a:spLocks noGrp="1" noChangeArrowheads="1"/>
-          </p:cNvSpPr>
-          <p:nvPr>
-            <p:ph type="title"/>
-          </p:nvPr>
-        </p:nvSpPr>
-        <p:spPr/>
-        <p:txBody>
-          <a:bodyPr/>
-          <a:lstStyle/>
-          <a:p>
-            <a:r>
-              <a:rPr lang="en-US"/>
-              <a:t>Code Optimization</a:t>
-            </a:r>
-          </a:p>
-        </p:txBody>
-      </p:sp>
-      <p:sp>
-        <p:nvSpPr>
-          <p:cNvPr id="4101" name="Rectangle 3"/>
-          <p:cNvSpPr>
-            <a:spLocks noGrp="1" noChangeArrowheads="1"/>
-          </p:cNvSpPr>
-          <p:nvPr>
-            <p:ph type="body" idx="1"/>
-          </p:nvPr>
-        </p:nvSpPr>
-        <p:spPr/>
-        <p:txBody>
-          <a:bodyPr/>
-          <a:lstStyle/>
-          <a:p>
-            <a:r>
-              <a:rPr lang="en-US" dirty="0"/>
-              <a:t>Code optimization refers to code generation techniques and transformations that result in a semantically equivalent program that runs more efficiently.</a:t>
-            </a:r>
-          </a:p>
-          <a:p>
-            <a:pPr lvl="1"/>
-            <a:r>
-              <a:rPr lang="en-US" dirty="0"/>
-              <a:t>faster</a:t>
-            </a:r>
-          </a:p>
-          <a:p>
-            <a:pPr lvl="1"/>
-            <a:r>
-              <a:rPr lang="en-US" dirty="0"/>
-              <a:t>uses less memory</a:t>
-            </a:r>
-          </a:p>
-          <a:p>
-            <a:pPr lvl="1"/>
-            <a:r>
-              <a:rPr lang="en-US" dirty="0"/>
-              <a:t>or both</a:t>
-            </a:r>
-          </a:p>
-          <a:p>
-            <a:r>
-              <a:rPr lang="en-US" dirty="0"/>
-              <a:t>Often involves a time-space tradeoff.  Techniques that make the code faster often require additional memory, and conversely</a:t>
-            </a:r>
-          </a:p>
-          <a:p>
-            <a:r>
-              <a:rPr lang="en-US" dirty="0"/>
-              <a:t>Term “optimization” is actually used improperly</a:t>
-            </a:r>
-          </a:p>
-          <a:p>
-            <a:pPr lvl="1"/>
-            <a:r>
-              <a:rPr lang="en-US" dirty="0"/>
-              <a:t>generated code is rarely optimal</a:t>
-            </a:r>
-          </a:p>
-          <a:p>
-            <a:pPr lvl="1"/>
-            <a:r>
-              <a:rPr lang="en-US" dirty="0"/>
-              <a:t>better name might be “code improvements”</a:t>
-            </a:r>
-          </a:p>
-        </p:txBody>
-      </p:sp>
-    </p:spTree>
   </p:cSld>
   <p:clrMapOvr>
     <a:masterClrMapping/>
@@ -7590,10 +8366,9 @@
             <a:p>
               <a:pPr algn="ctr"/>
               <a:r>
-                <a:rPr lang="en-US" sz="2000" dirty="0" err="1"/>
-                <a:t>Kotlin</a:t>
+                <a:rPr lang="en-US" sz="2000" dirty="0"/>
+                <a:t>Rust</a:t>
               </a:r>
-              <a:endParaRPr lang="en-US" sz="2000" dirty="0"/>
             </a:p>
             <a:p>
               <a:pPr algn="ctr"/>

</xml_diff>